<commit_message>
completed fulfilment analysis in ppt
</commit_message>
<xml_diff>
--- a/Amazon Sales Analysis.pptx
+++ b/Amazon Sales Analysis.pptx
@@ -11,6 +11,16 @@
     <p:sldId id="259" r:id="rId5"/>
     <p:sldId id="260" r:id="rId6"/>
     <p:sldId id="261" r:id="rId7"/>
+    <p:sldId id="262" r:id="rId8"/>
+    <p:sldId id="263" r:id="rId9"/>
+    <p:sldId id="264" r:id="rId10"/>
+    <p:sldId id="265" r:id="rId11"/>
+    <p:sldId id="266" r:id="rId12"/>
+    <p:sldId id="267" r:id="rId13"/>
+    <p:sldId id="270" r:id="rId14"/>
+    <p:sldId id="268" r:id="rId15"/>
+    <p:sldId id="269" r:id="rId16"/>
+    <p:sldId id="271" r:id="rId17"/>
   </p:sldIdLst>
   <p:sldSz cx="12192000" cy="6858000"/>
   <p:notesSz cx="6858000" cy="9144000"/>
@@ -4384,7 +4394,7 @@
           <a:p>
             <a:fld id="{7DE75820-1E16-4B92-989B-B7184BA5CDFD}" type="datetimeFigureOut">
               <a:rPr lang="en-IN" smtClean="0"/>
-              <a:t>14-11-2024</a:t>
+              <a:t>16-11-2024</a:t>
             </a:fld>
             <a:endParaRPr lang="en-IN"/>
           </a:p>
@@ -4584,7 +4594,7 @@
           <a:p>
             <a:fld id="{7DE75820-1E16-4B92-989B-B7184BA5CDFD}" type="datetimeFigureOut">
               <a:rPr lang="en-IN" smtClean="0"/>
-              <a:t>14-11-2024</a:t>
+              <a:t>16-11-2024</a:t>
             </a:fld>
             <a:endParaRPr lang="en-IN"/>
           </a:p>
@@ -4794,7 +4804,7 @@
           <a:p>
             <a:fld id="{7DE75820-1E16-4B92-989B-B7184BA5CDFD}" type="datetimeFigureOut">
               <a:rPr lang="en-IN" smtClean="0"/>
-              <a:t>14-11-2024</a:t>
+              <a:t>16-11-2024</a:t>
             </a:fld>
             <a:endParaRPr lang="en-IN"/>
           </a:p>
@@ -4994,7 +5004,7 @@
           <a:p>
             <a:fld id="{7DE75820-1E16-4B92-989B-B7184BA5CDFD}" type="datetimeFigureOut">
               <a:rPr lang="en-IN" smtClean="0"/>
-              <a:t>14-11-2024</a:t>
+              <a:t>16-11-2024</a:t>
             </a:fld>
             <a:endParaRPr lang="en-IN"/>
           </a:p>
@@ -5270,7 +5280,7 @@
           <a:p>
             <a:fld id="{7DE75820-1E16-4B92-989B-B7184BA5CDFD}" type="datetimeFigureOut">
               <a:rPr lang="en-IN" smtClean="0"/>
-              <a:t>14-11-2024</a:t>
+              <a:t>16-11-2024</a:t>
             </a:fld>
             <a:endParaRPr lang="en-IN"/>
           </a:p>
@@ -5538,7 +5548,7 @@
           <a:p>
             <a:fld id="{7DE75820-1E16-4B92-989B-B7184BA5CDFD}" type="datetimeFigureOut">
               <a:rPr lang="en-IN" smtClean="0"/>
-              <a:t>14-11-2024</a:t>
+              <a:t>16-11-2024</a:t>
             </a:fld>
             <a:endParaRPr lang="en-IN"/>
           </a:p>
@@ -5953,7 +5963,7 @@
           <a:p>
             <a:fld id="{7DE75820-1E16-4B92-989B-B7184BA5CDFD}" type="datetimeFigureOut">
               <a:rPr lang="en-IN" smtClean="0"/>
-              <a:t>14-11-2024</a:t>
+              <a:t>16-11-2024</a:t>
             </a:fld>
             <a:endParaRPr lang="en-IN"/>
           </a:p>
@@ -6095,7 +6105,7 @@
           <a:p>
             <a:fld id="{7DE75820-1E16-4B92-989B-B7184BA5CDFD}" type="datetimeFigureOut">
               <a:rPr lang="en-IN" smtClean="0"/>
-              <a:t>14-11-2024</a:t>
+              <a:t>16-11-2024</a:t>
             </a:fld>
             <a:endParaRPr lang="en-IN"/>
           </a:p>
@@ -6208,7 +6218,7 @@
           <a:p>
             <a:fld id="{7DE75820-1E16-4B92-989B-B7184BA5CDFD}" type="datetimeFigureOut">
               <a:rPr lang="en-IN" smtClean="0"/>
-              <a:t>14-11-2024</a:t>
+              <a:t>16-11-2024</a:t>
             </a:fld>
             <a:endParaRPr lang="en-IN"/>
           </a:p>
@@ -6521,7 +6531,7 @@
           <a:p>
             <a:fld id="{7DE75820-1E16-4B92-989B-B7184BA5CDFD}" type="datetimeFigureOut">
               <a:rPr lang="en-IN" smtClean="0"/>
-              <a:t>14-11-2024</a:t>
+              <a:t>16-11-2024</a:t>
             </a:fld>
             <a:endParaRPr lang="en-IN"/>
           </a:p>
@@ -6810,7 +6820,7 @@
           <a:p>
             <a:fld id="{7DE75820-1E16-4B92-989B-B7184BA5CDFD}" type="datetimeFigureOut">
               <a:rPr lang="en-IN" smtClean="0"/>
-              <a:t>14-11-2024</a:t>
+              <a:t>16-11-2024</a:t>
             </a:fld>
             <a:endParaRPr lang="en-IN"/>
           </a:p>
@@ -7053,7 +7063,7 @@
           <a:p>
             <a:fld id="{7DE75820-1E16-4B92-989B-B7184BA5CDFD}" type="datetimeFigureOut">
               <a:rPr lang="en-IN" smtClean="0"/>
-              <a:t>14-11-2024</a:t>
+              <a:t>16-11-2024</a:t>
             </a:fld>
             <a:endParaRPr lang="en-IN"/>
           </a:p>
@@ -7552,6 +7562,1360 @@
 </p:sld>
 </file>
 
+<file path=ppt/slides/slide10.xml><?xml version="1.0" encoding="utf-8"?>
+<p:sld xmlns:a="http://schemas.openxmlformats.org/drawingml/2006/main" xmlns:r="http://schemas.openxmlformats.org/officeDocument/2006/relationships" xmlns:p="http://schemas.openxmlformats.org/presentationml/2006/main">
+  <p:cSld>
+    <p:spTree>
+      <p:nvGrpSpPr>
+        <p:cNvPr id="1" name=""/>
+        <p:cNvGrpSpPr/>
+        <p:nvPr/>
+      </p:nvGrpSpPr>
+      <p:grpSpPr>
+        <a:xfrm>
+          <a:off x="0" y="0"/>
+          <a:ext cx="0" cy="0"/>
+          <a:chOff x="0" y="0"/>
+          <a:chExt cx="0" cy="0"/>
+        </a:xfrm>
+      </p:grpSpPr>
+      <p:sp>
+        <p:nvSpPr>
+          <p:cNvPr id="2" name="Title 1">
+            <a:extLst>
+              <a:ext uri="{FF2B5EF4-FFF2-40B4-BE49-F238E27FC236}">
+                <a16:creationId xmlns:a16="http://schemas.microsoft.com/office/drawing/2014/main" id="{5EBA2E77-334D-75A3-4894-6B248EA6406C}"/>
+              </a:ext>
+            </a:extLst>
+          </p:cNvPr>
+          <p:cNvSpPr>
+            <a:spLocks noGrp="1"/>
+          </p:cNvSpPr>
+          <p:nvPr>
+            <p:ph type="title"/>
+          </p:nvPr>
+        </p:nvSpPr>
+        <p:spPr>
+          <a:xfrm>
+            <a:off x="838200" y="2498725"/>
+            <a:ext cx="10515600" cy="1325563"/>
+          </a:xfrm>
+        </p:spPr>
+        <p:txBody>
+          <a:bodyPr/>
+          <a:lstStyle/>
+          <a:p>
+            <a:pPr algn="ctr"/>
+            <a:r>
+              <a:rPr lang="en-US" dirty="0"/>
+              <a:t>Insights</a:t>
+            </a:r>
+            <a:endParaRPr lang="en-IN" dirty="0"/>
+          </a:p>
+        </p:txBody>
+      </p:sp>
+    </p:spTree>
+    <p:extLst>
+      <p:ext uri="{BB962C8B-B14F-4D97-AF65-F5344CB8AC3E}">
+        <p14:creationId xmlns:p14="http://schemas.microsoft.com/office/powerpoint/2010/main" val="2215156248"/>
+      </p:ext>
+    </p:extLst>
+  </p:cSld>
+  <p:clrMapOvr>
+    <a:masterClrMapping/>
+  </p:clrMapOvr>
+</p:sld>
+</file>
+
+<file path=ppt/slides/slide11.xml><?xml version="1.0" encoding="utf-8"?>
+<p:sld xmlns:a="http://schemas.openxmlformats.org/drawingml/2006/main" xmlns:r="http://schemas.openxmlformats.org/officeDocument/2006/relationships" xmlns:p="http://schemas.openxmlformats.org/presentationml/2006/main">
+  <p:cSld>
+    <p:spTree>
+      <p:nvGrpSpPr>
+        <p:cNvPr id="1" name=""/>
+        <p:cNvGrpSpPr/>
+        <p:nvPr/>
+      </p:nvGrpSpPr>
+      <p:grpSpPr>
+        <a:xfrm>
+          <a:off x="0" y="0"/>
+          <a:ext cx="0" cy="0"/>
+          <a:chOff x="0" y="0"/>
+          <a:chExt cx="0" cy="0"/>
+        </a:xfrm>
+      </p:grpSpPr>
+      <p:sp>
+        <p:nvSpPr>
+          <p:cNvPr id="2" name="Title 1">
+            <a:extLst>
+              <a:ext uri="{FF2B5EF4-FFF2-40B4-BE49-F238E27FC236}">
+                <a16:creationId xmlns:a16="http://schemas.microsoft.com/office/drawing/2014/main" id="{34E04B07-C782-2E8B-ED42-22E8AD82DE25}"/>
+              </a:ext>
+            </a:extLst>
+          </p:cNvPr>
+          <p:cNvSpPr>
+            <a:spLocks noGrp="1"/>
+          </p:cNvSpPr>
+          <p:nvPr>
+            <p:ph type="title"/>
+          </p:nvPr>
+        </p:nvSpPr>
+        <p:spPr/>
+        <p:txBody>
+          <a:bodyPr/>
+          <a:lstStyle/>
+          <a:p>
+            <a:pPr algn="ctr"/>
+            <a:r>
+              <a:rPr lang="en-US" b="1" dirty="0">
+                <a:latin typeface="Aptos" panose="020B0004020202020204" pitchFamily="34" charset="0"/>
+              </a:rPr>
+              <a:t>Sales Overview</a:t>
+            </a:r>
+            <a:endParaRPr lang="en-IN" b="1" dirty="0">
+              <a:latin typeface="Aptos" panose="020B0004020202020204" pitchFamily="34" charset="0"/>
+            </a:endParaRPr>
+          </a:p>
+        </p:txBody>
+      </p:sp>
+      <p:sp>
+        <p:nvSpPr>
+          <p:cNvPr id="3" name="Content Placeholder 2">
+            <a:extLst>
+              <a:ext uri="{FF2B5EF4-FFF2-40B4-BE49-F238E27FC236}">
+                <a16:creationId xmlns:a16="http://schemas.microsoft.com/office/drawing/2014/main" id="{7B381A56-2300-FC4B-3260-D91F7D85BDBB}"/>
+              </a:ext>
+            </a:extLst>
+          </p:cNvPr>
+          <p:cNvSpPr>
+            <a:spLocks noGrp="1"/>
+          </p:cNvSpPr>
+          <p:nvPr>
+            <p:ph idx="1"/>
+          </p:nvPr>
+        </p:nvSpPr>
+        <p:spPr>
+          <a:xfrm>
+            <a:off x="838200" y="1690689"/>
+            <a:ext cx="10724535" cy="1416306"/>
+          </a:xfrm>
+        </p:spPr>
+        <p:txBody>
+          <a:bodyPr>
+            <a:normAutofit/>
+          </a:bodyPr>
+          <a:lstStyle/>
+          <a:p>
+            <a:r>
+              <a:rPr lang="en-US" sz="2400" dirty="0"/>
+              <a:t>Around </a:t>
+            </a:r>
+            <a:r>
+              <a:rPr lang="en-US" sz="2400" b="1" dirty="0"/>
+              <a:t>114K</a:t>
+            </a:r>
+            <a:r>
+              <a:rPr lang="en-US" sz="2400" dirty="0"/>
+              <a:t> units are sold out with an amount of </a:t>
+            </a:r>
+            <a:r>
+              <a:rPr lang="en-US" sz="2400" b="1" dirty="0"/>
+              <a:t>₹78.57 </a:t>
+            </a:r>
+            <a:r>
+              <a:rPr lang="en-US" sz="2400" dirty="0"/>
+              <a:t>Million and through </a:t>
+            </a:r>
+            <a:r>
+              <a:rPr lang="en-US" sz="2400" b="1" dirty="0"/>
+              <a:t>1,10,519 </a:t>
+            </a:r>
+            <a:r>
+              <a:rPr lang="en-US" sz="2400" dirty="0"/>
+              <a:t>orders.</a:t>
+            </a:r>
+          </a:p>
+          <a:p>
+            <a:r>
+              <a:rPr lang="en-US" sz="2400" dirty="0"/>
+              <a:t>Around </a:t>
+            </a:r>
+            <a:r>
+              <a:rPr lang="en-US" sz="2400" b="1" dirty="0"/>
+              <a:t>11K</a:t>
+            </a:r>
+            <a:r>
+              <a:rPr lang="en-US" sz="2400" dirty="0"/>
+              <a:t> Orders are cancelled, which is around </a:t>
+            </a:r>
+            <a:r>
+              <a:rPr lang="en-US" sz="2400" b="1" dirty="0"/>
+              <a:t>9% </a:t>
+            </a:r>
+            <a:r>
+              <a:rPr lang="en-US" sz="2400" dirty="0"/>
+              <a:t>of whole orders.</a:t>
+            </a:r>
+          </a:p>
+          <a:p>
+            <a:endParaRPr lang="en-US" dirty="0"/>
+          </a:p>
+          <a:p>
+            <a:endParaRPr lang="en-US" dirty="0"/>
+          </a:p>
+          <a:p>
+            <a:pPr marL="0" indent="0">
+              <a:buNone/>
+            </a:pPr>
+            <a:endParaRPr lang="en-US" dirty="0"/>
+          </a:p>
+          <a:p>
+            <a:endParaRPr lang="en-US" dirty="0"/>
+          </a:p>
+        </p:txBody>
+      </p:sp>
+      <p:pic>
+        <p:nvPicPr>
+          <p:cNvPr id="5" name="Picture 4">
+            <a:extLst>
+              <a:ext uri="{FF2B5EF4-FFF2-40B4-BE49-F238E27FC236}">
+                <a16:creationId xmlns:a16="http://schemas.microsoft.com/office/drawing/2014/main" id="{7CC49CFB-F357-67E8-A51A-901384131BBD}"/>
+              </a:ext>
+            </a:extLst>
+          </p:cNvPr>
+          <p:cNvPicPr>
+            <a:picLocks noChangeAspect="1"/>
+          </p:cNvPicPr>
+          <p:nvPr/>
+        </p:nvPicPr>
+        <p:blipFill>
+          <a:blip r:embed="rId2"/>
+          <a:stretch>
+            <a:fillRect/>
+          </a:stretch>
+        </p:blipFill>
+        <p:spPr>
+          <a:xfrm>
+            <a:off x="3687097" y="3370006"/>
+            <a:ext cx="7322872" cy="2822425"/>
+          </a:xfrm>
+          <a:prstGeom prst="rect">
+            <a:avLst/>
+          </a:prstGeom>
+        </p:spPr>
+      </p:pic>
+      <p:pic>
+        <p:nvPicPr>
+          <p:cNvPr id="7" name="Picture 6">
+            <a:extLst>
+              <a:ext uri="{FF2B5EF4-FFF2-40B4-BE49-F238E27FC236}">
+                <a16:creationId xmlns:a16="http://schemas.microsoft.com/office/drawing/2014/main" id="{57303EA6-0EBB-4BF5-F785-ABDCE98A67AD}"/>
+              </a:ext>
+            </a:extLst>
+          </p:cNvPr>
+          <p:cNvPicPr>
+            <a:picLocks noChangeAspect="1"/>
+          </p:cNvPicPr>
+          <p:nvPr/>
+        </p:nvPicPr>
+        <p:blipFill>
+          <a:blip r:embed="rId3"/>
+          <a:stretch>
+            <a:fillRect/>
+          </a:stretch>
+        </p:blipFill>
+        <p:spPr>
+          <a:xfrm>
+            <a:off x="1096471" y="4214277"/>
+            <a:ext cx="2467060" cy="1243346"/>
+          </a:xfrm>
+          <a:prstGeom prst="rect">
+            <a:avLst/>
+          </a:prstGeom>
+        </p:spPr>
+      </p:pic>
+    </p:spTree>
+    <p:extLst>
+      <p:ext uri="{BB962C8B-B14F-4D97-AF65-F5344CB8AC3E}">
+        <p14:creationId xmlns:p14="http://schemas.microsoft.com/office/powerpoint/2010/main" val="2791663988"/>
+      </p:ext>
+    </p:extLst>
+  </p:cSld>
+  <p:clrMapOvr>
+    <a:masterClrMapping/>
+  </p:clrMapOvr>
+</p:sld>
+</file>
+
+<file path=ppt/slides/slide12.xml><?xml version="1.0" encoding="utf-8"?>
+<p:sld xmlns:a="http://schemas.openxmlformats.org/drawingml/2006/main" xmlns:r="http://schemas.openxmlformats.org/officeDocument/2006/relationships" xmlns:p="http://schemas.openxmlformats.org/presentationml/2006/main">
+  <p:cSld>
+    <p:spTree>
+      <p:nvGrpSpPr>
+        <p:cNvPr id="1" name=""/>
+        <p:cNvGrpSpPr/>
+        <p:nvPr/>
+      </p:nvGrpSpPr>
+      <p:grpSpPr>
+        <a:xfrm>
+          <a:off x="0" y="0"/>
+          <a:ext cx="0" cy="0"/>
+          <a:chOff x="0" y="0"/>
+          <a:chExt cx="0" cy="0"/>
+        </a:xfrm>
+      </p:grpSpPr>
+      <p:pic>
+        <p:nvPicPr>
+          <p:cNvPr id="5" name="Picture 4">
+            <a:extLst>
+              <a:ext uri="{FF2B5EF4-FFF2-40B4-BE49-F238E27FC236}">
+                <a16:creationId xmlns:a16="http://schemas.microsoft.com/office/drawing/2014/main" id="{8BE8354F-DDD0-0D9A-A1B2-9EE481503B94}"/>
+              </a:ext>
+            </a:extLst>
+          </p:cNvPr>
+          <p:cNvPicPr>
+            <a:picLocks noChangeAspect="1"/>
+          </p:cNvPicPr>
+          <p:nvPr/>
+        </p:nvPicPr>
+        <p:blipFill>
+          <a:blip r:embed="rId2"/>
+          <a:srcRect l="279" r="-279"/>
+          <a:stretch/>
+        </p:blipFill>
+        <p:spPr>
+          <a:xfrm>
+            <a:off x="561667" y="1101214"/>
+            <a:ext cx="11068665" cy="5587202"/>
+          </a:xfrm>
+          <a:prstGeom prst="rect">
+            <a:avLst/>
+          </a:prstGeom>
+        </p:spPr>
+      </p:pic>
+      <p:sp>
+        <p:nvSpPr>
+          <p:cNvPr id="2" name="Title 1">
+            <a:extLst>
+              <a:ext uri="{FF2B5EF4-FFF2-40B4-BE49-F238E27FC236}">
+                <a16:creationId xmlns:a16="http://schemas.microsoft.com/office/drawing/2014/main" id="{6BEFE8CC-0B77-1F8B-4A18-7F4D1B1AC49D}"/>
+              </a:ext>
+            </a:extLst>
+          </p:cNvPr>
+          <p:cNvSpPr>
+            <a:spLocks noGrp="1"/>
+          </p:cNvSpPr>
+          <p:nvPr>
+            <p:ph type="title"/>
+          </p:nvPr>
+        </p:nvSpPr>
+        <p:spPr>
+          <a:xfrm>
+            <a:off x="838200" y="365126"/>
+            <a:ext cx="10515600" cy="736088"/>
+          </a:xfrm>
+        </p:spPr>
+        <p:txBody>
+          <a:bodyPr/>
+          <a:lstStyle/>
+          <a:p>
+            <a:pPr algn="ctr"/>
+            <a:r>
+              <a:rPr lang="en-US" b="1" dirty="0">
+                <a:latin typeface="Aptos" panose="020B0004020202020204" pitchFamily="34" charset="0"/>
+              </a:rPr>
+              <a:t>Product Analysis</a:t>
+            </a:r>
+            <a:endParaRPr lang="en-IN" b="1" dirty="0">
+              <a:latin typeface="Aptos" panose="020B0004020202020204" pitchFamily="34" charset="0"/>
+            </a:endParaRPr>
+          </a:p>
+        </p:txBody>
+      </p:sp>
+      <p:sp>
+        <p:nvSpPr>
+          <p:cNvPr id="3" name="Content Placeholder 2">
+            <a:extLst>
+              <a:ext uri="{FF2B5EF4-FFF2-40B4-BE49-F238E27FC236}">
+                <a16:creationId xmlns:a16="http://schemas.microsoft.com/office/drawing/2014/main" id="{3DEBDAA7-0A4D-32CA-E461-08E8DB185EDE}"/>
+              </a:ext>
+            </a:extLst>
+          </p:cNvPr>
+          <p:cNvSpPr>
+            <a:spLocks noGrp="1"/>
+          </p:cNvSpPr>
+          <p:nvPr>
+            <p:ph idx="1"/>
+          </p:nvPr>
+        </p:nvSpPr>
+        <p:spPr>
+          <a:xfrm>
+            <a:off x="7524136" y="1837302"/>
+            <a:ext cx="3399503" cy="2686665"/>
+          </a:xfrm>
+        </p:spPr>
+        <p:txBody>
+          <a:bodyPr>
+            <a:normAutofit/>
+          </a:bodyPr>
+          <a:lstStyle/>
+          <a:p>
+            <a:r>
+              <a:rPr lang="en-US" sz="2400" b="1" dirty="0"/>
+              <a:t>M,L </a:t>
+            </a:r>
+            <a:r>
+              <a:rPr lang="en-US" sz="2400" dirty="0"/>
+              <a:t>and </a:t>
+            </a:r>
+            <a:r>
+              <a:rPr lang="en-US" sz="2400" b="1" dirty="0"/>
+              <a:t>XL</a:t>
+            </a:r>
+            <a:r>
+              <a:rPr lang="en-US" sz="2400" dirty="0"/>
+              <a:t> are the most sold sizes.</a:t>
+            </a:r>
+          </a:p>
+          <a:p>
+            <a:r>
+              <a:rPr lang="en-US" sz="2400" dirty="0"/>
+              <a:t>Almost </a:t>
+            </a:r>
+            <a:r>
+              <a:rPr lang="en-US" sz="2400" b="1" dirty="0"/>
+              <a:t>50% </a:t>
+            </a:r>
+            <a:r>
+              <a:rPr lang="en-US" sz="2400" dirty="0"/>
+              <a:t>of Total Revenue is contributed by M,L and XL Sizes.</a:t>
+            </a:r>
+            <a:endParaRPr lang="en-IN" sz="2400" dirty="0"/>
+          </a:p>
+        </p:txBody>
+      </p:sp>
+    </p:spTree>
+    <p:extLst>
+      <p:ext uri="{BB962C8B-B14F-4D97-AF65-F5344CB8AC3E}">
+        <p14:creationId xmlns:p14="http://schemas.microsoft.com/office/powerpoint/2010/main" val="4114180535"/>
+      </p:ext>
+    </p:extLst>
+  </p:cSld>
+  <p:clrMapOvr>
+    <a:masterClrMapping/>
+  </p:clrMapOvr>
+</p:sld>
+</file>
+
+<file path=ppt/slides/slide13.xml><?xml version="1.0" encoding="utf-8"?>
+<p:sld xmlns:a="http://schemas.openxmlformats.org/drawingml/2006/main" xmlns:r="http://schemas.openxmlformats.org/officeDocument/2006/relationships" xmlns:p="http://schemas.openxmlformats.org/presentationml/2006/main">
+  <p:cSld>
+    <p:spTree>
+      <p:nvGrpSpPr>
+        <p:cNvPr id="1" name=""/>
+        <p:cNvGrpSpPr/>
+        <p:nvPr/>
+      </p:nvGrpSpPr>
+      <p:grpSpPr>
+        <a:xfrm>
+          <a:off x="0" y="0"/>
+          <a:ext cx="0" cy="0"/>
+          <a:chOff x="0" y="0"/>
+          <a:chExt cx="0" cy="0"/>
+        </a:xfrm>
+      </p:grpSpPr>
+      <p:sp>
+        <p:nvSpPr>
+          <p:cNvPr id="2" name="Title 1">
+            <a:extLst>
+              <a:ext uri="{FF2B5EF4-FFF2-40B4-BE49-F238E27FC236}">
+                <a16:creationId xmlns:a16="http://schemas.microsoft.com/office/drawing/2014/main" id="{C6340461-D5BA-A626-65DB-A04CF22DE857}"/>
+              </a:ext>
+            </a:extLst>
+          </p:cNvPr>
+          <p:cNvSpPr>
+            <a:spLocks noGrp="1"/>
+          </p:cNvSpPr>
+          <p:nvPr>
+            <p:ph type="title"/>
+          </p:nvPr>
+        </p:nvSpPr>
+        <p:spPr>
+          <a:xfrm>
+            <a:off x="838200" y="365126"/>
+            <a:ext cx="10515600" cy="782910"/>
+          </a:xfrm>
+        </p:spPr>
+        <p:txBody>
+          <a:bodyPr/>
+          <a:lstStyle/>
+          <a:p>
+            <a:pPr algn="ctr"/>
+            <a:r>
+              <a:rPr lang="en-US" b="1" dirty="0">
+                <a:latin typeface="Aptos" panose="020B0004020202020204" pitchFamily="34" charset="0"/>
+              </a:rPr>
+              <a:t>Product Analysis</a:t>
+            </a:r>
+            <a:endParaRPr lang="en-IN" b="1" dirty="0">
+              <a:latin typeface="Aptos" panose="020B0004020202020204" pitchFamily="34" charset="0"/>
+            </a:endParaRPr>
+          </a:p>
+        </p:txBody>
+      </p:sp>
+      <p:pic>
+        <p:nvPicPr>
+          <p:cNvPr id="5" name="Content Placeholder 4">
+            <a:extLst>
+              <a:ext uri="{FF2B5EF4-FFF2-40B4-BE49-F238E27FC236}">
+                <a16:creationId xmlns:a16="http://schemas.microsoft.com/office/drawing/2014/main" id="{7D548AF2-A3D3-FFCE-0EB3-E9015A3F7DFA}"/>
+              </a:ext>
+            </a:extLst>
+          </p:cNvPr>
+          <p:cNvPicPr>
+            <a:picLocks noGrp="1" noChangeAspect="1"/>
+          </p:cNvPicPr>
+          <p:nvPr>
+            <p:ph idx="1"/>
+          </p:nvPr>
+        </p:nvPicPr>
+        <p:blipFill>
+          <a:blip r:embed="rId2"/>
+          <a:stretch>
+            <a:fillRect/>
+          </a:stretch>
+        </p:blipFill>
+        <p:spPr>
+          <a:xfrm>
+            <a:off x="550607" y="1049714"/>
+            <a:ext cx="11090786" cy="5636561"/>
+          </a:xfrm>
+        </p:spPr>
+      </p:pic>
+      <p:sp>
+        <p:nvSpPr>
+          <p:cNvPr id="9" name="TextBox 8">
+            <a:extLst>
+              <a:ext uri="{FF2B5EF4-FFF2-40B4-BE49-F238E27FC236}">
+                <a16:creationId xmlns:a16="http://schemas.microsoft.com/office/drawing/2014/main" id="{BBF31E3D-A97E-4C91-CF28-B61B581460DF}"/>
+              </a:ext>
+            </a:extLst>
+          </p:cNvPr>
+          <p:cNvSpPr txBox="1"/>
+          <p:nvPr/>
+        </p:nvSpPr>
+        <p:spPr>
+          <a:xfrm>
+            <a:off x="5496232" y="3429000"/>
+            <a:ext cx="5388078" cy="1631216"/>
+          </a:xfrm>
+          <a:prstGeom prst="rect">
+            <a:avLst/>
+          </a:prstGeom>
+          <a:noFill/>
+        </p:spPr>
+        <p:txBody>
+          <a:bodyPr wrap="square">
+            <a:spAutoFit/>
+          </a:bodyPr>
+          <a:lstStyle/>
+          <a:p>
+            <a:pPr marL="285750" indent="-285750">
+              <a:buFont typeface="Arial" panose="020B0604020202020204" pitchFamily="34" charset="0"/>
+              <a:buChar char="•"/>
+            </a:pPr>
+            <a:r>
+              <a:rPr lang="en-US" sz="2000" b="1" dirty="0"/>
+              <a:t>T- shirts </a:t>
+            </a:r>
+            <a:r>
+              <a:rPr lang="en-US" sz="2000" dirty="0"/>
+              <a:t>and </a:t>
+            </a:r>
+            <a:r>
+              <a:rPr lang="en-US" sz="2000" b="1" dirty="0"/>
+              <a:t>Shirts</a:t>
+            </a:r>
+            <a:r>
+              <a:rPr lang="en-US" sz="2000" dirty="0"/>
+              <a:t> are the most sold among all categories with the total amount of </a:t>
+            </a:r>
+            <a:r>
+              <a:rPr lang="en-US" sz="2000" b="1" dirty="0"/>
+              <a:t>₹39.2M </a:t>
+            </a:r>
+            <a:r>
+              <a:rPr lang="en-US" sz="2000" dirty="0"/>
+              <a:t>and </a:t>
+            </a:r>
+            <a:r>
+              <a:rPr lang="en-US" sz="2000" b="1" dirty="0"/>
+              <a:t>₹21.29M </a:t>
+            </a:r>
+            <a:r>
+              <a:rPr lang="en-US" sz="2000" dirty="0"/>
+              <a:t>respectively.</a:t>
+            </a:r>
+          </a:p>
+          <a:p>
+            <a:pPr marL="285750" indent="-285750">
+              <a:buFont typeface="Arial" panose="020B0604020202020204" pitchFamily="34" charset="0"/>
+              <a:buChar char="•"/>
+            </a:pPr>
+            <a:r>
+              <a:rPr lang="en-US" sz="2000" dirty="0"/>
+              <a:t>T-shirts and Shirts are contributing </a:t>
+            </a:r>
+            <a:r>
+              <a:rPr lang="en-US" sz="2000" b="1" dirty="0"/>
+              <a:t>77% </a:t>
+            </a:r>
+            <a:r>
+              <a:rPr lang="en-US" sz="2000" dirty="0"/>
+              <a:t>of Total Revenue</a:t>
+            </a:r>
+            <a:r>
+              <a:rPr lang="en-US" dirty="0"/>
+              <a:t>.</a:t>
+            </a:r>
+          </a:p>
+        </p:txBody>
+      </p:sp>
+    </p:spTree>
+    <p:extLst>
+      <p:ext uri="{BB962C8B-B14F-4D97-AF65-F5344CB8AC3E}">
+        <p14:creationId xmlns:p14="http://schemas.microsoft.com/office/powerpoint/2010/main" val="1535086055"/>
+      </p:ext>
+    </p:extLst>
+  </p:cSld>
+  <p:clrMapOvr>
+    <a:masterClrMapping/>
+  </p:clrMapOvr>
+</p:sld>
+</file>
+
+<file path=ppt/slides/slide14.xml><?xml version="1.0" encoding="utf-8"?>
+<p:sld xmlns:a="http://schemas.openxmlformats.org/drawingml/2006/main" xmlns:r="http://schemas.openxmlformats.org/officeDocument/2006/relationships" xmlns:p="http://schemas.openxmlformats.org/presentationml/2006/main">
+  <p:cSld>
+    <p:spTree>
+      <p:nvGrpSpPr>
+        <p:cNvPr id="1" name=""/>
+        <p:cNvGrpSpPr/>
+        <p:nvPr/>
+      </p:nvGrpSpPr>
+      <p:grpSpPr>
+        <a:xfrm>
+          <a:off x="0" y="0"/>
+          <a:ext cx="0" cy="0"/>
+          <a:chOff x="0" y="0"/>
+          <a:chExt cx="0" cy="0"/>
+        </a:xfrm>
+      </p:grpSpPr>
+      <p:pic>
+        <p:nvPicPr>
+          <p:cNvPr id="13" name="Picture 12">
+            <a:extLst>
+              <a:ext uri="{FF2B5EF4-FFF2-40B4-BE49-F238E27FC236}">
+                <a16:creationId xmlns:a16="http://schemas.microsoft.com/office/drawing/2014/main" id="{9B289B44-B12D-4E3E-6DCE-CEF89C2CE39C}"/>
+              </a:ext>
+            </a:extLst>
+          </p:cNvPr>
+          <p:cNvPicPr>
+            <a:picLocks noChangeAspect="1"/>
+          </p:cNvPicPr>
+          <p:nvPr/>
+        </p:nvPicPr>
+        <p:blipFill>
+          <a:blip r:embed="rId2"/>
+          <a:stretch>
+            <a:fillRect/>
+          </a:stretch>
+        </p:blipFill>
+        <p:spPr>
+          <a:xfrm>
+            <a:off x="3064264" y="1236792"/>
+            <a:ext cx="6075290" cy="3597687"/>
+          </a:xfrm>
+          <a:prstGeom prst="rect">
+            <a:avLst/>
+          </a:prstGeom>
+        </p:spPr>
+      </p:pic>
+      <p:sp>
+        <p:nvSpPr>
+          <p:cNvPr id="2" name="Title 1">
+            <a:extLst>
+              <a:ext uri="{FF2B5EF4-FFF2-40B4-BE49-F238E27FC236}">
+                <a16:creationId xmlns:a16="http://schemas.microsoft.com/office/drawing/2014/main" id="{78A0E6F6-4ED5-8BFE-4339-B9303DC7E36A}"/>
+              </a:ext>
+            </a:extLst>
+          </p:cNvPr>
+          <p:cNvSpPr>
+            <a:spLocks noGrp="1"/>
+          </p:cNvSpPr>
+          <p:nvPr>
+            <p:ph type="title"/>
+          </p:nvPr>
+        </p:nvSpPr>
+        <p:spPr>
+          <a:xfrm>
+            <a:off x="838200" y="365125"/>
+            <a:ext cx="10515600" cy="539443"/>
+          </a:xfrm>
+        </p:spPr>
+        <p:txBody>
+          <a:bodyPr>
+            <a:normAutofit fontScale="90000"/>
+          </a:bodyPr>
+          <a:lstStyle/>
+          <a:p>
+            <a:pPr algn="ctr"/>
+            <a:r>
+              <a:rPr lang="en-US" b="1" dirty="0">
+                <a:latin typeface="Aptos" panose="020B0004020202020204" pitchFamily="34" charset="0"/>
+              </a:rPr>
+              <a:t>Fulfillment Analysis</a:t>
+            </a:r>
+            <a:endParaRPr lang="en-IN" b="1" dirty="0">
+              <a:latin typeface="Aptos" panose="020B0004020202020204" pitchFamily="34" charset="0"/>
+            </a:endParaRPr>
+          </a:p>
+        </p:txBody>
+      </p:sp>
+      <p:sp>
+        <p:nvSpPr>
+          <p:cNvPr id="3" name="Content Placeholder 2">
+            <a:extLst>
+              <a:ext uri="{FF2B5EF4-FFF2-40B4-BE49-F238E27FC236}">
+                <a16:creationId xmlns:a16="http://schemas.microsoft.com/office/drawing/2014/main" id="{72585F27-64EC-94B3-DB12-BBDB0C4ABD13}"/>
+              </a:ext>
+            </a:extLst>
+          </p:cNvPr>
+          <p:cNvSpPr>
+            <a:spLocks noGrp="1"/>
+          </p:cNvSpPr>
+          <p:nvPr>
+            <p:ph idx="1"/>
+          </p:nvPr>
+        </p:nvSpPr>
+        <p:spPr>
+          <a:xfrm>
+            <a:off x="661221" y="5220632"/>
+            <a:ext cx="11019502" cy="1219200"/>
+          </a:xfrm>
+        </p:spPr>
+        <p:txBody>
+          <a:bodyPr/>
+          <a:lstStyle/>
+          <a:p>
+            <a:r>
+              <a:rPr lang="en-US" b="1" dirty="0"/>
+              <a:t>76670</a:t>
+            </a:r>
+            <a:r>
+              <a:rPr lang="en-US" dirty="0"/>
+              <a:t> orders </a:t>
+            </a:r>
+            <a:r>
+              <a:rPr lang="en-US" b="1" dirty="0"/>
+              <a:t>(69%) </a:t>
+            </a:r>
+            <a:r>
+              <a:rPr lang="en-US" dirty="0"/>
+              <a:t>are fulfilled by Amazon and rest are fulfilled by their merchants.</a:t>
+            </a:r>
+          </a:p>
+          <a:p>
+            <a:pPr marL="0" indent="0">
+              <a:buNone/>
+            </a:pPr>
+            <a:endParaRPr lang="en-US" dirty="0"/>
+          </a:p>
+          <a:p>
+            <a:endParaRPr lang="en-IN" dirty="0"/>
+          </a:p>
+        </p:txBody>
+      </p:sp>
+      <p:pic>
+        <p:nvPicPr>
+          <p:cNvPr id="15" name="Picture 14">
+            <a:extLst>
+              <a:ext uri="{FF2B5EF4-FFF2-40B4-BE49-F238E27FC236}">
+                <a16:creationId xmlns:a16="http://schemas.microsoft.com/office/drawing/2014/main" id="{45846DA3-B2F4-166E-B390-1A2A69484462}"/>
+              </a:ext>
+            </a:extLst>
+          </p:cNvPr>
+          <p:cNvPicPr>
+            <a:picLocks noChangeAspect="1"/>
+          </p:cNvPicPr>
+          <p:nvPr/>
+        </p:nvPicPr>
+        <p:blipFill>
+          <a:blip r:embed="rId3"/>
+          <a:stretch>
+            <a:fillRect/>
+          </a:stretch>
+        </p:blipFill>
+        <p:spPr>
+          <a:xfrm>
+            <a:off x="803192" y="1584409"/>
+            <a:ext cx="2086350" cy="3250070"/>
+          </a:xfrm>
+          <a:prstGeom prst="rect">
+            <a:avLst/>
+          </a:prstGeom>
+        </p:spPr>
+      </p:pic>
+      <p:pic>
+        <p:nvPicPr>
+          <p:cNvPr id="17" name="Picture 16">
+            <a:extLst>
+              <a:ext uri="{FF2B5EF4-FFF2-40B4-BE49-F238E27FC236}">
+                <a16:creationId xmlns:a16="http://schemas.microsoft.com/office/drawing/2014/main" id="{79932637-310A-5A4F-91A6-BDF4A0612FF0}"/>
+              </a:ext>
+            </a:extLst>
+          </p:cNvPr>
+          <p:cNvPicPr>
+            <a:picLocks noChangeAspect="1"/>
+          </p:cNvPicPr>
+          <p:nvPr/>
+        </p:nvPicPr>
+        <p:blipFill>
+          <a:blip r:embed="rId4"/>
+          <a:stretch>
+            <a:fillRect/>
+          </a:stretch>
+        </p:blipFill>
+        <p:spPr>
+          <a:xfrm>
+            <a:off x="9269469" y="1655302"/>
+            <a:ext cx="2084331" cy="3179177"/>
+          </a:xfrm>
+          <a:prstGeom prst="rect">
+            <a:avLst/>
+          </a:prstGeom>
+        </p:spPr>
+      </p:pic>
+      <p:sp>
+        <p:nvSpPr>
+          <p:cNvPr id="18" name="TextBox 17">
+            <a:extLst>
+              <a:ext uri="{FF2B5EF4-FFF2-40B4-BE49-F238E27FC236}">
+                <a16:creationId xmlns:a16="http://schemas.microsoft.com/office/drawing/2014/main" id="{158972F0-582E-9F96-C097-E1FC4916E99D}"/>
+              </a:ext>
+            </a:extLst>
+          </p:cNvPr>
+          <p:cNvSpPr txBox="1"/>
+          <p:nvPr/>
+        </p:nvSpPr>
+        <p:spPr>
+          <a:xfrm>
+            <a:off x="9568857" y="1008971"/>
+            <a:ext cx="1485553" cy="646331"/>
+          </a:xfrm>
+          <a:prstGeom prst="rect">
+            <a:avLst/>
+          </a:prstGeom>
+          <a:noFill/>
+        </p:spPr>
+        <p:txBody>
+          <a:bodyPr wrap="square" rtlCol="0">
+            <a:spAutoFit/>
+          </a:bodyPr>
+          <a:lstStyle/>
+          <a:p>
+            <a:pPr algn="ctr"/>
+            <a:r>
+              <a:rPr lang="en-US" dirty="0"/>
+              <a:t>Fulfilled by Amazon</a:t>
+            </a:r>
+            <a:endParaRPr lang="en-IN" dirty="0"/>
+          </a:p>
+        </p:txBody>
+      </p:sp>
+      <p:sp>
+        <p:nvSpPr>
+          <p:cNvPr id="19" name="TextBox 18">
+            <a:extLst>
+              <a:ext uri="{FF2B5EF4-FFF2-40B4-BE49-F238E27FC236}">
+                <a16:creationId xmlns:a16="http://schemas.microsoft.com/office/drawing/2014/main" id="{1B9F01C7-FA7D-48A8-C892-D6E3328832D7}"/>
+              </a:ext>
+            </a:extLst>
+          </p:cNvPr>
+          <p:cNvSpPr txBox="1"/>
+          <p:nvPr/>
+        </p:nvSpPr>
+        <p:spPr>
+          <a:xfrm>
+            <a:off x="640286" y="972682"/>
+            <a:ext cx="2412162" cy="646331"/>
+          </a:xfrm>
+          <a:prstGeom prst="rect">
+            <a:avLst/>
+          </a:prstGeom>
+          <a:noFill/>
+        </p:spPr>
+        <p:txBody>
+          <a:bodyPr wrap="square" rtlCol="0">
+            <a:spAutoFit/>
+          </a:bodyPr>
+          <a:lstStyle/>
+          <a:p>
+            <a:pPr algn="ctr"/>
+            <a:r>
+              <a:rPr lang="en-US" dirty="0"/>
+              <a:t>Fulfilled by both Amazon and Merchants</a:t>
+            </a:r>
+            <a:endParaRPr lang="en-IN" dirty="0"/>
+          </a:p>
+        </p:txBody>
+      </p:sp>
+    </p:spTree>
+    <p:extLst>
+      <p:ext uri="{BB962C8B-B14F-4D97-AF65-F5344CB8AC3E}">
+        <p14:creationId xmlns:p14="http://schemas.microsoft.com/office/powerpoint/2010/main" val="447108976"/>
+      </p:ext>
+    </p:extLst>
+  </p:cSld>
+  <p:clrMapOvr>
+    <a:masterClrMapping/>
+  </p:clrMapOvr>
+</p:sld>
+</file>
+
+<file path=ppt/slides/slide15.xml><?xml version="1.0" encoding="utf-8"?>
+<p:sld xmlns:a="http://schemas.openxmlformats.org/drawingml/2006/main" xmlns:r="http://schemas.openxmlformats.org/officeDocument/2006/relationships" xmlns:p="http://schemas.openxmlformats.org/presentationml/2006/main">
+  <p:cSld>
+    <p:spTree>
+      <p:nvGrpSpPr>
+        <p:cNvPr id="1" name=""/>
+        <p:cNvGrpSpPr/>
+        <p:nvPr/>
+      </p:nvGrpSpPr>
+      <p:grpSpPr>
+        <a:xfrm>
+          <a:off x="0" y="0"/>
+          <a:ext cx="0" cy="0"/>
+          <a:chOff x="0" y="0"/>
+          <a:chExt cx="0" cy="0"/>
+        </a:xfrm>
+      </p:grpSpPr>
+      <p:sp>
+        <p:nvSpPr>
+          <p:cNvPr id="2" name="Title 1">
+            <a:extLst>
+              <a:ext uri="{FF2B5EF4-FFF2-40B4-BE49-F238E27FC236}">
+                <a16:creationId xmlns:a16="http://schemas.microsoft.com/office/drawing/2014/main" id="{DA07D83A-1547-931B-1504-453B68ED8475}"/>
+              </a:ext>
+            </a:extLst>
+          </p:cNvPr>
+          <p:cNvSpPr>
+            <a:spLocks noGrp="1"/>
+          </p:cNvSpPr>
+          <p:nvPr>
+            <p:ph type="title"/>
+          </p:nvPr>
+        </p:nvSpPr>
+        <p:spPr>
+          <a:xfrm>
+            <a:off x="838200" y="365125"/>
+            <a:ext cx="10515600" cy="795081"/>
+          </a:xfrm>
+        </p:spPr>
+        <p:txBody>
+          <a:bodyPr/>
+          <a:lstStyle/>
+          <a:p>
+            <a:pPr algn="ctr"/>
+            <a:r>
+              <a:rPr lang="en-US" b="1" dirty="0">
+                <a:latin typeface="Aptos" panose="020B0004020202020204" pitchFamily="34" charset="0"/>
+              </a:rPr>
+              <a:t>Fulfilment Analysis</a:t>
+            </a:r>
+            <a:endParaRPr lang="en-IN" b="1" dirty="0">
+              <a:latin typeface="Aptos" panose="020B0004020202020204" pitchFamily="34" charset="0"/>
+            </a:endParaRPr>
+          </a:p>
+        </p:txBody>
+      </p:sp>
+      <p:sp>
+        <p:nvSpPr>
+          <p:cNvPr id="3" name="Content Placeholder 2">
+            <a:extLst>
+              <a:ext uri="{FF2B5EF4-FFF2-40B4-BE49-F238E27FC236}">
+                <a16:creationId xmlns:a16="http://schemas.microsoft.com/office/drawing/2014/main" id="{852BB500-238B-DA5E-0E2C-33FD971995D3}"/>
+              </a:ext>
+            </a:extLst>
+          </p:cNvPr>
+          <p:cNvSpPr>
+            <a:spLocks noGrp="1"/>
+          </p:cNvSpPr>
+          <p:nvPr>
+            <p:ph idx="1"/>
+          </p:nvPr>
+        </p:nvSpPr>
+        <p:spPr>
+          <a:xfrm>
+            <a:off x="838200" y="1229032"/>
+            <a:ext cx="10515600" cy="5093110"/>
+          </a:xfrm>
+        </p:spPr>
+        <p:txBody>
+          <a:bodyPr/>
+          <a:lstStyle/>
+          <a:p>
+            <a:r>
+              <a:rPr lang="en-US" dirty="0"/>
+              <a:t>Almost </a:t>
+            </a:r>
+            <a:r>
+              <a:rPr lang="en-US" b="1" dirty="0"/>
+              <a:t>14% </a:t>
+            </a:r>
+            <a:r>
+              <a:rPr lang="en-US" dirty="0"/>
+              <a:t>of orders are cancelled through the </a:t>
+            </a:r>
+            <a:r>
+              <a:rPr lang="en-US" b="1" dirty="0"/>
+              <a:t>Merchant</a:t>
+            </a:r>
+            <a:r>
+              <a:rPr lang="en-US" dirty="0"/>
+              <a:t> fulfilment which is significantly high.</a:t>
+            </a:r>
+          </a:p>
+          <a:p>
+            <a:endParaRPr lang="en-IN" dirty="0"/>
+          </a:p>
+        </p:txBody>
+      </p:sp>
+      <p:pic>
+        <p:nvPicPr>
+          <p:cNvPr id="5" name="Picture 4">
+            <a:extLst>
+              <a:ext uri="{FF2B5EF4-FFF2-40B4-BE49-F238E27FC236}">
+                <a16:creationId xmlns:a16="http://schemas.microsoft.com/office/drawing/2014/main" id="{2BB01E4E-F24F-C0B9-736A-AE5CCBB432EB}"/>
+              </a:ext>
+            </a:extLst>
+          </p:cNvPr>
+          <p:cNvPicPr>
+            <a:picLocks noChangeAspect="1"/>
+          </p:cNvPicPr>
+          <p:nvPr/>
+        </p:nvPicPr>
+        <p:blipFill>
+          <a:blip r:embed="rId2"/>
+          <a:stretch>
+            <a:fillRect/>
+          </a:stretch>
+        </p:blipFill>
+        <p:spPr>
+          <a:xfrm>
+            <a:off x="3842939" y="2805684"/>
+            <a:ext cx="7542596" cy="2823284"/>
+          </a:xfrm>
+          <a:prstGeom prst="rect">
+            <a:avLst/>
+          </a:prstGeom>
+        </p:spPr>
+      </p:pic>
+      <p:pic>
+        <p:nvPicPr>
+          <p:cNvPr id="7" name="Picture 6">
+            <a:extLst>
+              <a:ext uri="{FF2B5EF4-FFF2-40B4-BE49-F238E27FC236}">
+                <a16:creationId xmlns:a16="http://schemas.microsoft.com/office/drawing/2014/main" id="{BEE1B094-DB69-DDBB-F1DA-25B217EEC53F}"/>
+              </a:ext>
+            </a:extLst>
+          </p:cNvPr>
+          <p:cNvPicPr>
+            <a:picLocks noChangeAspect="1"/>
+          </p:cNvPicPr>
+          <p:nvPr/>
+        </p:nvPicPr>
+        <p:blipFill>
+          <a:blip r:embed="rId3"/>
+          <a:stretch>
+            <a:fillRect/>
+          </a:stretch>
+        </p:blipFill>
+        <p:spPr>
+          <a:xfrm>
+            <a:off x="1125465" y="3429000"/>
+            <a:ext cx="2717474" cy="1428135"/>
+          </a:xfrm>
+          <a:prstGeom prst="rect">
+            <a:avLst/>
+          </a:prstGeom>
+        </p:spPr>
+      </p:pic>
+    </p:spTree>
+    <p:extLst>
+      <p:ext uri="{BB962C8B-B14F-4D97-AF65-F5344CB8AC3E}">
+        <p14:creationId xmlns:p14="http://schemas.microsoft.com/office/powerpoint/2010/main" val="235864559"/>
+      </p:ext>
+    </p:extLst>
+  </p:cSld>
+  <p:clrMapOvr>
+    <a:masterClrMapping/>
+  </p:clrMapOvr>
+</p:sld>
+</file>
+
+<file path=ppt/slides/slide16.xml><?xml version="1.0" encoding="utf-8"?>
+<p:sld xmlns:a="http://schemas.openxmlformats.org/drawingml/2006/main" xmlns:r="http://schemas.openxmlformats.org/officeDocument/2006/relationships" xmlns:p="http://schemas.openxmlformats.org/presentationml/2006/main">
+  <p:cSld>
+    <p:spTree>
+      <p:nvGrpSpPr>
+        <p:cNvPr id="1" name=""/>
+        <p:cNvGrpSpPr/>
+        <p:nvPr/>
+      </p:nvGrpSpPr>
+      <p:grpSpPr>
+        <a:xfrm>
+          <a:off x="0" y="0"/>
+          <a:ext cx="0" cy="0"/>
+          <a:chOff x="0" y="0"/>
+          <a:chExt cx="0" cy="0"/>
+        </a:xfrm>
+      </p:grpSpPr>
+      <p:sp>
+        <p:nvSpPr>
+          <p:cNvPr id="2" name="Title 1">
+            <a:extLst>
+              <a:ext uri="{FF2B5EF4-FFF2-40B4-BE49-F238E27FC236}">
+                <a16:creationId xmlns:a16="http://schemas.microsoft.com/office/drawing/2014/main" id="{98AFA462-2034-69A2-FBD0-83FAD68B5D7C}"/>
+              </a:ext>
+            </a:extLst>
+          </p:cNvPr>
+          <p:cNvSpPr>
+            <a:spLocks noGrp="1"/>
+          </p:cNvSpPr>
+          <p:nvPr>
+            <p:ph type="title"/>
+          </p:nvPr>
+        </p:nvSpPr>
+        <p:spPr/>
+        <p:txBody>
+          <a:bodyPr/>
+          <a:lstStyle/>
+          <a:p>
+            <a:pPr algn="ctr"/>
+            <a:r>
+              <a:rPr lang="en-US" b="1" dirty="0">
+                <a:latin typeface="Aptos" panose="020B0004020202020204" pitchFamily="34" charset="0"/>
+              </a:rPr>
+              <a:t>Cancelled orders by Fulfilment methods</a:t>
+            </a:r>
+            <a:endParaRPr lang="en-IN" b="1" dirty="0">
+              <a:latin typeface="Aptos" panose="020B0004020202020204" pitchFamily="34" charset="0"/>
+            </a:endParaRPr>
+          </a:p>
+        </p:txBody>
+      </p:sp>
+      <p:sp>
+        <p:nvSpPr>
+          <p:cNvPr id="3" name="Content Placeholder 2">
+            <a:extLst>
+              <a:ext uri="{FF2B5EF4-FFF2-40B4-BE49-F238E27FC236}">
+                <a16:creationId xmlns:a16="http://schemas.microsoft.com/office/drawing/2014/main" id="{5457F4AC-D8C0-72B8-5FA8-F1CFE991666D}"/>
+              </a:ext>
+            </a:extLst>
+          </p:cNvPr>
+          <p:cNvSpPr>
+            <a:spLocks noGrp="1"/>
+          </p:cNvSpPr>
+          <p:nvPr>
+            <p:ph idx="1"/>
+          </p:nvPr>
+        </p:nvSpPr>
+        <p:spPr>
+          <a:xfrm>
+            <a:off x="838200" y="1504335"/>
+            <a:ext cx="10515600" cy="4672628"/>
+          </a:xfrm>
+        </p:spPr>
+        <p:txBody>
+          <a:bodyPr>
+            <a:normAutofit/>
+          </a:bodyPr>
+          <a:lstStyle/>
+          <a:p>
+            <a:r>
+              <a:rPr lang="en-US" sz="2400" dirty="0"/>
+              <a:t>Lakshadweep, Mizoram, Andaman &amp; Nicobar, Ladakh and Dadra Nagar are getting more orders cancelled through Merchant Fulfilment.</a:t>
+            </a:r>
+          </a:p>
+          <a:p>
+            <a:r>
+              <a:rPr lang="en-US" sz="2400" dirty="0"/>
+              <a:t>Mizoram, Kerala, Ladakh, Arunachal Pradesh and Meghalaya are getting more cancelled orders through Amazon Fulfilment.</a:t>
+            </a:r>
+          </a:p>
+          <a:p>
+            <a:r>
+              <a:rPr lang="en-US" sz="2400" dirty="0"/>
+              <a:t>Hilly Regions and Islands are getting more cancelled orders.</a:t>
+            </a:r>
+          </a:p>
+          <a:p>
+            <a:r>
+              <a:rPr lang="en-US" sz="2400" dirty="0"/>
+              <a:t>Merchant Fulfilment had more cancelled percentage than Amazon Fulfilment.</a:t>
+            </a:r>
+            <a:endParaRPr lang="en-IN" sz="2400" dirty="0"/>
+          </a:p>
+        </p:txBody>
+      </p:sp>
+      <p:pic>
+        <p:nvPicPr>
+          <p:cNvPr id="7" name="Picture 6">
+            <a:extLst>
+              <a:ext uri="{FF2B5EF4-FFF2-40B4-BE49-F238E27FC236}">
+                <a16:creationId xmlns:a16="http://schemas.microsoft.com/office/drawing/2014/main" id="{1FBC4936-2AEA-BB23-D691-760621C2C1CD}"/>
+              </a:ext>
+            </a:extLst>
+          </p:cNvPr>
+          <p:cNvPicPr>
+            <a:picLocks noChangeAspect="1"/>
+          </p:cNvPicPr>
+          <p:nvPr/>
+        </p:nvPicPr>
+        <p:blipFill>
+          <a:blip r:embed="rId2"/>
+          <a:stretch>
+            <a:fillRect/>
+          </a:stretch>
+        </p:blipFill>
+        <p:spPr>
+          <a:xfrm>
+            <a:off x="1113502" y="4575540"/>
+            <a:ext cx="4570337" cy="2021495"/>
+          </a:xfrm>
+          <a:prstGeom prst="rect">
+            <a:avLst/>
+          </a:prstGeom>
+        </p:spPr>
+      </p:pic>
+      <p:pic>
+        <p:nvPicPr>
+          <p:cNvPr id="9" name="Picture 8">
+            <a:extLst>
+              <a:ext uri="{FF2B5EF4-FFF2-40B4-BE49-F238E27FC236}">
+                <a16:creationId xmlns:a16="http://schemas.microsoft.com/office/drawing/2014/main" id="{79657A9E-A58F-C72D-6F9B-549D47635C8B}"/>
+              </a:ext>
+            </a:extLst>
+          </p:cNvPr>
+          <p:cNvPicPr>
+            <a:picLocks noChangeAspect="1"/>
+          </p:cNvPicPr>
+          <p:nvPr/>
+        </p:nvPicPr>
+        <p:blipFill>
+          <a:blip r:embed="rId3"/>
+          <a:stretch>
+            <a:fillRect/>
+          </a:stretch>
+        </p:blipFill>
+        <p:spPr>
+          <a:xfrm>
+            <a:off x="6840123" y="4575540"/>
+            <a:ext cx="4444851" cy="2021495"/>
+          </a:xfrm>
+          <a:prstGeom prst="rect">
+            <a:avLst/>
+          </a:prstGeom>
+        </p:spPr>
+      </p:pic>
+      <p:sp>
+        <p:nvSpPr>
+          <p:cNvPr id="10" name="TextBox 9">
+            <a:extLst>
+              <a:ext uri="{FF2B5EF4-FFF2-40B4-BE49-F238E27FC236}">
+                <a16:creationId xmlns:a16="http://schemas.microsoft.com/office/drawing/2014/main" id="{7698980B-6E5A-D6B8-947B-98AEC51E5DE0}"/>
+              </a:ext>
+            </a:extLst>
+          </p:cNvPr>
+          <p:cNvSpPr txBox="1"/>
+          <p:nvPr/>
+        </p:nvSpPr>
+        <p:spPr>
+          <a:xfrm>
+            <a:off x="1113501" y="4155468"/>
+            <a:ext cx="4570337" cy="373626"/>
+          </a:xfrm>
+          <a:prstGeom prst="rect">
+            <a:avLst/>
+          </a:prstGeom>
+          <a:noFill/>
+        </p:spPr>
+        <p:txBody>
+          <a:bodyPr wrap="square" rtlCol="0">
+            <a:spAutoFit/>
+          </a:bodyPr>
+          <a:lstStyle/>
+          <a:p>
+            <a:pPr algn="ctr"/>
+            <a:r>
+              <a:rPr lang="en-US" b="1" dirty="0"/>
+              <a:t>Merchant</a:t>
+            </a:r>
+            <a:endParaRPr lang="en-IN" b="1" dirty="0"/>
+          </a:p>
+        </p:txBody>
+      </p:sp>
+      <p:sp>
+        <p:nvSpPr>
+          <p:cNvPr id="11" name="TextBox 10">
+            <a:extLst>
+              <a:ext uri="{FF2B5EF4-FFF2-40B4-BE49-F238E27FC236}">
+                <a16:creationId xmlns:a16="http://schemas.microsoft.com/office/drawing/2014/main" id="{CCDDCEFE-D335-408D-0C0A-E36530A64835}"/>
+              </a:ext>
+            </a:extLst>
+          </p:cNvPr>
+          <p:cNvSpPr txBox="1"/>
+          <p:nvPr/>
+        </p:nvSpPr>
+        <p:spPr>
+          <a:xfrm>
+            <a:off x="6840123" y="4155449"/>
+            <a:ext cx="4444851" cy="373626"/>
+          </a:xfrm>
+          <a:prstGeom prst="rect">
+            <a:avLst/>
+          </a:prstGeom>
+          <a:noFill/>
+        </p:spPr>
+        <p:txBody>
+          <a:bodyPr wrap="square" rtlCol="0">
+            <a:spAutoFit/>
+          </a:bodyPr>
+          <a:lstStyle/>
+          <a:p>
+            <a:pPr algn="ctr"/>
+            <a:r>
+              <a:rPr lang="en-US" b="1" dirty="0"/>
+              <a:t>Amazon</a:t>
+            </a:r>
+            <a:endParaRPr lang="en-IN" b="1" dirty="0"/>
+          </a:p>
+        </p:txBody>
+      </p:sp>
+    </p:spTree>
+    <p:extLst>
+      <p:ext uri="{BB962C8B-B14F-4D97-AF65-F5344CB8AC3E}">
+        <p14:creationId xmlns:p14="http://schemas.microsoft.com/office/powerpoint/2010/main" val="4009966099"/>
+      </p:ext>
+    </p:extLst>
+  </p:cSld>
+  <p:clrMapOvr>
+    <a:masterClrMapping/>
+  </p:clrMapOvr>
+</p:sld>
+</file>
+
 <file path=ppt/slides/slide2.xml><?xml version="1.0" encoding="utf-8"?>
 <p:sld xmlns:a="http://schemas.openxmlformats.org/drawingml/2006/main" xmlns:r="http://schemas.openxmlformats.org/officeDocument/2006/relationships" xmlns:p="http://schemas.openxmlformats.org/presentationml/2006/main">
   <p:cSld>
@@ -8091,6 +9455,270 @@
     <p:extLst>
       <p:ext uri="{BB962C8B-B14F-4D97-AF65-F5344CB8AC3E}">
         <p14:creationId xmlns:p14="http://schemas.microsoft.com/office/powerpoint/2010/main" val="3013790470"/>
+      </p:ext>
+    </p:extLst>
+  </p:cSld>
+  <p:clrMapOvr>
+    <a:masterClrMapping/>
+  </p:clrMapOvr>
+</p:sld>
+</file>
+
+<file path=ppt/slides/slide7.xml><?xml version="1.0" encoding="utf-8"?>
+<p:sld xmlns:a="http://schemas.openxmlformats.org/drawingml/2006/main" xmlns:r="http://schemas.openxmlformats.org/officeDocument/2006/relationships" xmlns:p="http://schemas.openxmlformats.org/presentationml/2006/main">
+  <p:cSld>
+    <p:spTree>
+      <p:nvGrpSpPr>
+        <p:cNvPr id="1" name=""/>
+        <p:cNvGrpSpPr/>
+        <p:nvPr/>
+      </p:nvGrpSpPr>
+      <p:grpSpPr>
+        <a:xfrm>
+          <a:off x="0" y="0"/>
+          <a:ext cx="0" cy="0"/>
+          <a:chOff x="0" y="0"/>
+          <a:chExt cx="0" cy="0"/>
+        </a:xfrm>
+      </p:grpSpPr>
+      <p:sp>
+        <p:nvSpPr>
+          <p:cNvPr id="2" name="Title 1">
+            <a:extLst>
+              <a:ext uri="{FF2B5EF4-FFF2-40B4-BE49-F238E27FC236}">
+                <a16:creationId xmlns:a16="http://schemas.microsoft.com/office/drawing/2014/main" id="{0096B394-0A35-94C3-2E21-68278453FAE0}"/>
+              </a:ext>
+            </a:extLst>
+          </p:cNvPr>
+          <p:cNvSpPr>
+            <a:spLocks noGrp="1"/>
+          </p:cNvSpPr>
+          <p:nvPr>
+            <p:ph type="title"/>
+          </p:nvPr>
+        </p:nvSpPr>
+        <p:spPr/>
+        <p:txBody>
+          <a:bodyPr/>
+          <a:lstStyle/>
+          <a:p>
+            <a:r>
+              <a:rPr lang="en-US" dirty="0"/>
+              <a:t>Dashboards</a:t>
+            </a:r>
+            <a:endParaRPr lang="en-IN" dirty="0"/>
+          </a:p>
+        </p:txBody>
+      </p:sp>
+      <p:sp>
+        <p:nvSpPr>
+          <p:cNvPr id="3" name="Content Placeholder 2">
+            <a:extLst>
+              <a:ext uri="{FF2B5EF4-FFF2-40B4-BE49-F238E27FC236}">
+                <a16:creationId xmlns:a16="http://schemas.microsoft.com/office/drawing/2014/main" id="{ADAE4170-BFAE-B1A4-A0C6-B4C232428032}"/>
+              </a:ext>
+            </a:extLst>
+          </p:cNvPr>
+          <p:cNvSpPr>
+            <a:spLocks noGrp="1"/>
+          </p:cNvSpPr>
+          <p:nvPr>
+            <p:ph idx="1"/>
+          </p:nvPr>
+        </p:nvSpPr>
+        <p:spPr/>
+        <p:txBody>
+          <a:bodyPr/>
+          <a:lstStyle/>
+          <a:p>
+            <a:endParaRPr lang="en-IN" dirty="0"/>
+          </a:p>
+        </p:txBody>
+      </p:sp>
+    </p:spTree>
+    <p:extLst>
+      <p:ext uri="{BB962C8B-B14F-4D97-AF65-F5344CB8AC3E}">
+        <p14:creationId xmlns:p14="http://schemas.microsoft.com/office/powerpoint/2010/main" val="741129196"/>
+      </p:ext>
+    </p:extLst>
+  </p:cSld>
+  <p:clrMapOvr>
+    <a:masterClrMapping/>
+  </p:clrMapOvr>
+</p:sld>
+</file>
+
+<file path=ppt/slides/slide8.xml><?xml version="1.0" encoding="utf-8"?>
+<p:sld xmlns:a="http://schemas.openxmlformats.org/drawingml/2006/main" xmlns:r="http://schemas.openxmlformats.org/officeDocument/2006/relationships" xmlns:p="http://schemas.openxmlformats.org/presentationml/2006/main">
+  <p:cSld>
+    <p:spTree>
+      <p:nvGrpSpPr>
+        <p:cNvPr id="1" name="">
+          <a:extLst>
+            <a:ext uri="{FF2B5EF4-FFF2-40B4-BE49-F238E27FC236}">
+              <a16:creationId xmlns:a16="http://schemas.microsoft.com/office/drawing/2014/main" id="{0A1B02A1-24F1-6543-C292-1F8D7B8FF78E}"/>
+            </a:ext>
+          </a:extLst>
+        </p:cNvPr>
+        <p:cNvGrpSpPr/>
+        <p:nvPr/>
+      </p:nvGrpSpPr>
+      <p:grpSpPr>
+        <a:xfrm>
+          <a:off x="0" y="0"/>
+          <a:ext cx="0" cy="0"/>
+          <a:chOff x="0" y="0"/>
+          <a:chExt cx="0" cy="0"/>
+        </a:xfrm>
+      </p:grpSpPr>
+      <p:sp>
+        <p:nvSpPr>
+          <p:cNvPr id="2" name="Title 1">
+            <a:extLst>
+              <a:ext uri="{FF2B5EF4-FFF2-40B4-BE49-F238E27FC236}">
+                <a16:creationId xmlns:a16="http://schemas.microsoft.com/office/drawing/2014/main" id="{94F3C3D1-B60F-16EC-E041-65BC01EB16CD}"/>
+              </a:ext>
+            </a:extLst>
+          </p:cNvPr>
+          <p:cNvSpPr>
+            <a:spLocks noGrp="1"/>
+          </p:cNvSpPr>
+          <p:nvPr>
+            <p:ph type="title"/>
+          </p:nvPr>
+        </p:nvSpPr>
+        <p:spPr/>
+        <p:txBody>
+          <a:bodyPr/>
+          <a:lstStyle/>
+          <a:p>
+            <a:r>
+              <a:rPr lang="en-US" dirty="0"/>
+              <a:t>Dashboards</a:t>
+            </a:r>
+            <a:endParaRPr lang="en-IN" dirty="0"/>
+          </a:p>
+        </p:txBody>
+      </p:sp>
+      <p:sp>
+        <p:nvSpPr>
+          <p:cNvPr id="3" name="Content Placeholder 2">
+            <a:extLst>
+              <a:ext uri="{FF2B5EF4-FFF2-40B4-BE49-F238E27FC236}">
+                <a16:creationId xmlns:a16="http://schemas.microsoft.com/office/drawing/2014/main" id="{AF7D0420-9416-A173-BA21-401BC3E6BF5D}"/>
+              </a:ext>
+            </a:extLst>
+          </p:cNvPr>
+          <p:cNvSpPr>
+            <a:spLocks noGrp="1"/>
+          </p:cNvSpPr>
+          <p:nvPr>
+            <p:ph idx="1"/>
+          </p:nvPr>
+        </p:nvSpPr>
+        <p:spPr/>
+        <p:txBody>
+          <a:bodyPr/>
+          <a:lstStyle/>
+          <a:p>
+            <a:endParaRPr lang="en-IN" dirty="0"/>
+          </a:p>
+        </p:txBody>
+      </p:sp>
+    </p:spTree>
+    <p:extLst>
+      <p:ext uri="{BB962C8B-B14F-4D97-AF65-F5344CB8AC3E}">
+        <p14:creationId xmlns:p14="http://schemas.microsoft.com/office/powerpoint/2010/main" val="3050087417"/>
+      </p:ext>
+    </p:extLst>
+  </p:cSld>
+  <p:clrMapOvr>
+    <a:masterClrMapping/>
+  </p:clrMapOvr>
+</p:sld>
+</file>
+
+<file path=ppt/slides/slide9.xml><?xml version="1.0" encoding="utf-8"?>
+<p:sld xmlns:a="http://schemas.openxmlformats.org/drawingml/2006/main" xmlns:r="http://schemas.openxmlformats.org/officeDocument/2006/relationships" xmlns:p="http://schemas.openxmlformats.org/presentationml/2006/main">
+  <p:cSld>
+    <p:spTree>
+      <p:nvGrpSpPr>
+        <p:cNvPr id="1" name="">
+          <a:extLst>
+            <a:ext uri="{FF2B5EF4-FFF2-40B4-BE49-F238E27FC236}">
+              <a16:creationId xmlns:a16="http://schemas.microsoft.com/office/drawing/2014/main" id="{3D9C89EB-6228-B8F9-8B12-640E6A930978}"/>
+            </a:ext>
+          </a:extLst>
+        </p:cNvPr>
+        <p:cNvGrpSpPr/>
+        <p:nvPr/>
+      </p:nvGrpSpPr>
+      <p:grpSpPr>
+        <a:xfrm>
+          <a:off x="0" y="0"/>
+          <a:ext cx="0" cy="0"/>
+          <a:chOff x="0" y="0"/>
+          <a:chExt cx="0" cy="0"/>
+        </a:xfrm>
+      </p:grpSpPr>
+      <p:sp>
+        <p:nvSpPr>
+          <p:cNvPr id="2" name="Title 1">
+            <a:extLst>
+              <a:ext uri="{FF2B5EF4-FFF2-40B4-BE49-F238E27FC236}">
+                <a16:creationId xmlns:a16="http://schemas.microsoft.com/office/drawing/2014/main" id="{8B4D6121-2208-2DE0-EB25-01062D09BF71}"/>
+              </a:ext>
+            </a:extLst>
+          </p:cNvPr>
+          <p:cNvSpPr>
+            <a:spLocks noGrp="1"/>
+          </p:cNvSpPr>
+          <p:nvPr>
+            <p:ph type="title"/>
+          </p:nvPr>
+        </p:nvSpPr>
+        <p:spPr/>
+        <p:txBody>
+          <a:bodyPr/>
+          <a:lstStyle/>
+          <a:p>
+            <a:r>
+              <a:rPr lang="en-US" dirty="0"/>
+              <a:t>Dashboards</a:t>
+            </a:r>
+            <a:endParaRPr lang="en-IN" dirty="0"/>
+          </a:p>
+        </p:txBody>
+      </p:sp>
+      <p:sp>
+        <p:nvSpPr>
+          <p:cNvPr id="3" name="Content Placeholder 2">
+            <a:extLst>
+              <a:ext uri="{FF2B5EF4-FFF2-40B4-BE49-F238E27FC236}">
+                <a16:creationId xmlns:a16="http://schemas.microsoft.com/office/drawing/2014/main" id="{37266C71-A01B-0288-CA18-564B25674CC7}"/>
+              </a:ext>
+            </a:extLst>
+          </p:cNvPr>
+          <p:cNvSpPr>
+            <a:spLocks noGrp="1"/>
+          </p:cNvSpPr>
+          <p:nvPr>
+            <p:ph idx="1"/>
+          </p:nvPr>
+        </p:nvSpPr>
+        <p:spPr/>
+        <p:txBody>
+          <a:bodyPr/>
+          <a:lstStyle/>
+          <a:p>
+            <a:endParaRPr lang="en-IN" dirty="0"/>
+          </a:p>
+        </p:txBody>
+      </p:sp>
+    </p:spTree>
+    <p:extLst>
+      <p:ext uri="{BB962C8B-B14F-4D97-AF65-F5344CB8AC3E}">
+        <p14:creationId xmlns:p14="http://schemas.microsoft.com/office/powerpoint/2010/main" val="2938843551"/>
       </p:ext>
     </p:extLst>
   </p:cSld>

</xml_diff>